<commit_message>
update presentation and add ErrorJson.java
</commit_message>
<xml_diff>
--- a/docs/Internet_banking.pptx
+++ b/docs/Internet_banking.pptx
@@ -5975,34 +5975,6 @@
           </a:xfrm>
         </p:spPr>
       </p:pic>
-      <p:sp>
-        <p:nvSpPr>
-          <p:cNvPr id="5" name="Прямоугольник 4"/>
-          <p:cNvSpPr/>
-          <p:nvPr/>
-        </p:nvSpPr>
-        <p:spPr>
-          <a:xfrm>
-            <a:off x="3464670" y="3244334"/>
-            <a:ext cx="5262659" cy="369332"/>
-          </a:xfrm>
-          <a:prstGeom prst="rect">
-            <a:avLst/>
-          </a:prstGeom>
-        </p:spPr>
-        <p:txBody>
-          <a:bodyPr wrap="none">
-            <a:spAutoFit/>
-          </a:bodyPr>
-          <a:lstStyle/>
-          <a:p>
-            <a:r>
-              <a:rPr lang="ru-RU" dirty="0"/>
-              <a:t>Предусмотреть возможность пополнения счета.</a:t>
-            </a:r>
-          </a:p>
-        </p:txBody>
-      </p:sp>
     </p:spTree>
     <p:extLst>
       <p:ext uri="{BB962C8B-B14F-4D97-AF65-F5344CB8AC3E}">
@@ -6099,7 +6071,18 @@
               <a:rPr lang="en-US" dirty="0" smtClean="0"/>
               <a:t>Swagger 2</a:t>
             </a:r>
-            <a:endParaRPr lang="ru-RU" dirty="0"/>
+            <a:endParaRPr lang="ru-RU" dirty="0" smtClean="0"/>
+          </a:p>
+          <a:p>
+            <a:r>
+              <a:rPr lang="en-US" dirty="0" smtClean="0"/>
+              <a:t>JUnit, </a:t>
+            </a:r>
+            <a:r>
+              <a:rPr lang="en-US" dirty="0" err="1" smtClean="0"/>
+              <a:t>Mockito</a:t>
+            </a:r>
+            <a:endParaRPr lang="en-US" dirty="0" smtClean="0"/>
           </a:p>
         </p:txBody>
       </p:sp>

</xml_diff>